<commit_message>
Corrected APDU responses handling
</commit_message>
<xml_diff>
--- a/resources/vertical-figures.pptx
+++ b/resources/vertical-figures.pptx
@@ -2843,7 +2843,7 @@
                 <a:latin typeface="Consolas"/>
                 <a:cs typeface="Consolas"/>
               </a:rPr>
-              <a:t>OK</a:t>
+              <a:t>ACK</a:t>
             </a:r>
           </a:p>
         </p:txBody>
@@ -2978,7 +2978,7 @@
         </p:nvCxnSpPr>
         <p:spPr bwMode="auto">
           <a:xfrm flipH="1">
-            <a:off x="586579" y="4119382"/>
+            <a:off x="586579" y="4362028"/>
             <a:ext cx="3977536" cy="0"/>
           </a:xfrm>
           <a:prstGeom prst="straightConnector1">
@@ -3007,8 +3007,8 @@
         </p:nvSpPr>
         <p:spPr>
           <a:xfrm>
-            <a:off x="1642783" y="3906361"/>
-            <a:ext cx="2851107" cy="400110"/>
+            <a:off x="1642783" y="4149007"/>
+            <a:ext cx="2851107" cy="246221"/>
           </a:xfrm>
           <a:prstGeom prst="rect">
             <a:avLst/>
@@ -3027,7 +3027,7 @@
                 <a:latin typeface="Consolas"/>
                 <a:cs typeface="Consolas"/>
               </a:rPr>
-              <a:t>Notification: APDU Response Ready</a:t>
+              <a:t>Notification: APDU Responses Ready</a:t>
             </a:r>
           </a:p>
         </p:txBody>
@@ -3040,7 +3040,7 @@
         </p:nvCxnSpPr>
         <p:spPr bwMode="auto">
           <a:xfrm>
-            <a:off x="586579" y="4585207"/>
+            <a:off x="586579" y="4919276"/>
             <a:ext cx="3982756" cy="0"/>
           </a:xfrm>
           <a:prstGeom prst="straightConnector1">
@@ -3069,7 +3069,7 @@
         </p:nvSpPr>
         <p:spPr>
           <a:xfrm>
-            <a:off x="1039131" y="4372186"/>
+            <a:off x="1039131" y="4706255"/>
             <a:ext cx="1594808" cy="246221"/>
           </a:xfrm>
           <a:prstGeom prst="rect">
@@ -3101,7 +3101,7 @@
         </p:nvCxnSpPr>
         <p:spPr bwMode="auto">
           <a:xfrm flipH="1">
-            <a:off x="596578" y="5064398"/>
+            <a:off x="596578" y="5159395"/>
             <a:ext cx="3957538" cy="0"/>
           </a:xfrm>
           <a:prstGeom prst="straightConnector1">
@@ -3130,7 +3130,7 @@
         </p:nvSpPr>
         <p:spPr>
           <a:xfrm>
-            <a:off x="1642783" y="4851377"/>
+            <a:off x="1642783" y="4946374"/>
             <a:ext cx="2851107" cy="246221"/>
           </a:xfrm>
           <a:prstGeom prst="rect">
@@ -3163,7 +3163,7 @@
         </p:nvCxnSpPr>
         <p:spPr bwMode="auto">
           <a:xfrm>
-            <a:off x="615004" y="6239679"/>
+            <a:off x="615004" y="6184173"/>
             <a:ext cx="3949111" cy="0"/>
           </a:xfrm>
           <a:prstGeom prst="straightConnector1">
@@ -3192,7 +3192,7 @@
         </p:nvSpPr>
         <p:spPr>
           <a:xfrm>
-            <a:off x="1067556" y="6026658"/>
+            <a:off x="1067556" y="5971152"/>
             <a:ext cx="2158864" cy="246221"/>
           </a:xfrm>
           <a:prstGeom prst="rect">
@@ -3273,7 +3273,7 @@
                 <a:latin typeface="Consolas"/>
                 <a:cs typeface="Consolas"/>
               </a:rPr>
-              <a:t>OK</a:t>
+              <a:t>ACK</a:t>
             </a:r>
           </a:p>
         </p:txBody>
@@ -3335,7 +3335,7 @@
                 <a:latin typeface="Consolas"/>
                 <a:cs typeface="Consolas"/>
               </a:rPr>
-              <a:t>OK</a:t>
+              <a:t>ACK</a:t>
             </a:r>
           </a:p>
         </p:txBody>
@@ -3458,7 +3458,7 @@
                 <a:latin typeface="Consolas"/>
                 <a:cs typeface="Consolas"/>
               </a:rPr>
-              <a:t>OK</a:t>
+              <a:t>ACK</a:t>
             </a:r>
           </a:p>
         </p:txBody>
@@ -3581,21 +3581,21 @@
                 <a:latin typeface="Consolas"/>
                 <a:cs typeface="Consolas"/>
               </a:rPr>
-              <a:t>OK</a:t>
+              <a:t>ACK</a:t>
             </a:r>
           </a:p>
         </p:txBody>
       </p:sp>
       <p:cxnSp>
         <p:nvCxnSpPr>
-          <p:cNvPr id="80" name="Straight Arrow Connector 79"/>
+          <p:cNvPr id="88" name="Straight Arrow Connector 87"/>
           <p:cNvCxnSpPr/>
           <p:nvPr/>
         </p:nvCxnSpPr>
         <p:spPr bwMode="auto">
           <a:xfrm flipH="1">
-            <a:off x="591358" y="4325561"/>
-            <a:ext cx="3972757" cy="0"/>
+            <a:off x="613358" y="5653603"/>
+            <a:ext cx="3957538" cy="0"/>
           </a:xfrm>
           <a:prstGeom prst="straightConnector1">
             <a:avLst/>
@@ -3603,28 +3603,28 @@
           <a:solidFill>
             <a:schemeClr val="accent1"/>
           </a:solidFill>
-          <a:ln w="3175" cap="flat" cmpd="sng" algn="ctr">
+          <a:ln w="12700" cap="flat" cmpd="sng" algn="ctr">
             <a:solidFill>
               <a:schemeClr val="tx1"/>
             </a:solidFill>
-            <a:prstDash val="sysDash"/>
+            <a:prstDash val="solid"/>
             <a:round/>
-            <a:headEnd type="arrow" w="med" len="med"/>
-            <a:tailEnd type="none"/>
+            <a:headEnd type="none" w="med" len="med"/>
+            <a:tailEnd type="arrow"/>
           </a:ln>
           <a:effectLst/>
         </p:spPr>
       </p:cxnSp>
       <p:sp>
         <p:nvSpPr>
-          <p:cNvPr id="81" name="TextBox 80"/>
+          <p:cNvPr id="89" name="TextBox 88"/>
           <p:cNvSpPr txBox="1"/>
           <p:nvPr/>
         </p:nvSpPr>
         <p:spPr>
           <a:xfrm>
-            <a:off x="708569" y="4112540"/>
-            <a:ext cx="797256" cy="246221"/>
+            <a:off x="1659563" y="5440582"/>
+            <a:ext cx="2851107" cy="246221"/>
           </a:xfrm>
           <a:prstGeom prst="rect">
             <a:avLst/>
@@ -3637,25 +3637,26 @@
           </a:bodyPr>
           <a:lstStyle/>
           <a:p>
+            <a:pPr algn="r"/>
             <a:r>
               <a:rPr lang="en-US" sz="1000">
                 <a:latin typeface="Consolas"/>
                 <a:cs typeface="Consolas"/>
               </a:rPr>
-              <a:t>OK</a:t>
+              <a:t>APDU Responses (fragment 1)</a:t>
             </a:r>
           </a:p>
         </p:txBody>
       </p:sp>
       <p:cxnSp>
         <p:nvCxnSpPr>
-          <p:cNvPr id="83" name="Straight Arrow Connector 82"/>
+          <p:cNvPr id="95" name="Straight Arrow Connector 94"/>
           <p:cNvCxnSpPr/>
           <p:nvPr/>
         </p:nvCxnSpPr>
         <p:spPr bwMode="auto">
           <a:xfrm flipH="1">
-            <a:off x="581359" y="4824586"/>
+            <a:off x="598139" y="6376355"/>
             <a:ext cx="3972757" cy="0"/>
           </a:xfrm>
           <a:prstGeom prst="straightConnector1">
@@ -3678,13 +3679,13 @@
       </p:cxnSp>
       <p:sp>
         <p:nvSpPr>
-          <p:cNvPr id="84" name="TextBox 83"/>
+          <p:cNvPr id="96" name="TextBox 95"/>
           <p:cNvSpPr txBox="1"/>
           <p:nvPr/>
         </p:nvSpPr>
         <p:spPr>
           <a:xfrm>
-            <a:off x="3632956" y="4611565"/>
+            <a:off x="3649736" y="6163334"/>
             <a:ext cx="797256" cy="246221"/>
           </a:xfrm>
           <a:prstGeom prst="rect">
@@ -3704,82 +3705,21 @@
                 <a:latin typeface="Consolas"/>
                 <a:cs typeface="Consolas"/>
               </a:rPr>
-              <a:t>OK</a:t>
+              <a:t>ACK</a:t>
             </a:r>
           </a:p>
         </p:txBody>
       </p:sp>
       <p:cxnSp>
         <p:nvCxnSpPr>
-          <p:cNvPr id="86" name="Straight Arrow Connector 85"/>
+          <p:cNvPr id="50" name="Straight Arrow Connector 49"/>
           <p:cNvCxnSpPr/>
           <p:nvPr/>
         </p:nvCxnSpPr>
         <p:spPr bwMode="auto">
-          <a:xfrm flipH="1">
-            <a:off x="581359" y="5295439"/>
-            <a:ext cx="3972757" cy="0"/>
-          </a:xfrm>
-          <a:prstGeom prst="straightConnector1">
-            <a:avLst/>
-          </a:prstGeom>
-          <a:solidFill>
-            <a:schemeClr val="accent1"/>
-          </a:solidFill>
-          <a:ln w="3175" cap="flat" cmpd="sng" algn="ctr">
-            <a:solidFill>
-              <a:schemeClr val="tx1"/>
-            </a:solidFill>
-            <a:prstDash val="sysDash"/>
-            <a:round/>
-            <a:headEnd type="arrow" w="med" len="med"/>
-            <a:tailEnd type="none"/>
-          </a:ln>
-          <a:effectLst/>
-        </p:spPr>
-      </p:cxnSp>
-      <p:sp>
-        <p:nvSpPr>
-          <p:cNvPr id="87" name="TextBox 86"/>
-          <p:cNvSpPr txBox="1"/>
-          <p:nvPr/>
-        </p:nvSpPr>
-        <p:spPr>
-          <a:xfrm>
-            <a:off x="698570" y="5082418"/>
-            <a:ext cx="797256" cy="246221"/>
-          </a:xfrm>
-          <a:prstGeom prst="rect">
-            <a:avLst/>
-          </a:prstGeom>
-          <a:noFill/>
-        </p:spPr>
-        <p:txBody>
-          <a:bodyPr wrap="square" rtlCol="0">
-            <a:spAutoFit/>
-          </a:bodyPr>
-          <a:lstStyle/>
-          <a:p>
-            <a:r>
-              <a:rPr lang="en-US" sz="1000">
-                <a:latin typeface="Consolas"/>
-                <a:cs typeface="Consolas"/>
-              </a:rPr>
-              <a:t>OK</a:t>
-            </a:r>
-          </a:p>
-        </p:txBody>
-      </p:sp>
-      <p:cxnSp>
-        <p:nvCxnSpPr>
-          <p:cNvPr id="88" name="Straight Arrow Connector 87"/>
-          <p:cNvCxnSpPr/>
-          <p:nvPr/>
-        </p:nvCxnSpPr>
-        <p:spPr bwMode="auto">
-          <a:xfrm flipH="1">
-            <a:off x="613358" y="5536193"/>
-            <a:ext cx="3957538" cy="0"/>
+          <a:xfrm>
+            <a:off x="615004" y="5403554"/>
+            <a:ext cx="3982756" cy="0"/>
           </a:xfrm>
           <a:prstGeom prst="straightConnector1">
             <a:avLst/>
@@ -3801,14 +3741,14 @@
       </p:cxnSp>
       <p:sp>
         <p:nvSpPr>
-          <p:cNvPr id="89" name="TextBox 88"/>
+          <p:cNvPr id="51" name="TextBox 50"/>
           <p:cNvSpPr txBox="1"/>
           <p:nvPr/>
         </p:nvSpPr>
         <p:spPr>
           <a:xfrm>
-            <a:off x="1659563" y="5323172"/>
-            <a:ext cx="2851107" cy="246221"/>
+            <a:off x="1067556" y="5190533"/>
+            <a:ext cx="1594808" cy="246221"/>
           </a:xfrm>
           <a:prstGeom prst="rect">
             <a:avLst/>
@@ -3816,141 +3756,17 @@
           <a:noFill/>
         </p:spPr>
         <p:txBody>
-          <a:bodyPr wrap="square" rtlCol="0">
+          <a:bodyPr wrap="none" rtlCol="0">
             <a:spAutoFit/>
           </a:bodyPr>
           <a:lstStyle/>
           <a:p>
-            <a:pPr algn="r"/>
             <a:r>
               <a:rPr lang="en-US" sz="1000">
                 <a:latin typeface="Consolas"/>
                 <a:cs typeface="Consolas"/>
               </a:rPr>
-              <a:t>APDU Responses (fragment 1)</a:t>
-            </a:r>
-          </a:p>
-        </p:txBody>
-      </p:sp>
-      <p:cxnSp>
-        <p:nvCxnSpPr>
-          <p:cNvPr id="90" name="Straight Arrow Connector 89"/>
-          <p:cNvCxnSpPr/>
-          <p:nvPr/>
-        </p:nvCxnSpPr>
-        <p:spPr bwMode="auto">
-          <a:xfrm flipH="1">
-            <a:off x="598139" y="5767234"/>
-            <a:ext cx="3972757" cy="0"/>
-          </a:xfrm>
-          <a:prstGeom prst="straightConnector1">
-            <a:avLst/>
-          </a:prstGeom>
-          <a:solidFill>
-            <a:schemeClr val="accent1"/>
-          </a:solidFill>
-          <a:ln w="3175" cap="flat" cmpd="sng" algn="ctr">
-            <a:solidFill>
-              <a:schemeClr val="tx1"/>
-            </a:solidFill>
-            <a:prstDash val="sysDash"/>
-            <a:round/>
-            <a:headEnd type="arrow" w="med" len="med"/>
-            <a:tailEnd type="none"/>
-          </a:ln>
-          <a:effectLst/>
-        </p:spPr>
-      </p:cxnSp>
-      <p:sp>
-        <p:nvSpPr>
-          <p:cNvPr id="91" name="TextBox 90"/>
-          <p:cNvSpPr txBox="1"/>
-          <p:nvPr/>
-        </p:nvSpPr>
-        <p:spPr>
-          <a:xfrm>
-            <a:off x="715350" y="5554213"/>
-            <a:ext cx="797256" cy="246221"/>
-          </a:xfrm>
-          <a:prstGeom prst="rect">
-            <a:avLst/>
-          </a:prstGeom>
-          <a:noFill/>
-        </p:spPr>
-        <p:txBody>
-          <a:bodyPr wrap="square" rtlCol="0">
-            <a:spAutoFit/>
-          </a:bodyPr>
-          <a:lstStyle/>
-          <a:p>
-            <a:r>
-              <a:rPr lang="en-US" sz="1000">
-                <a:latin typeface="Consolas"/>
-                <a:cs typeface="Consolas"/>
-              </a:rPr>
-              <a:t>OK</a:t>
-            </a:r>
-          </a:p>
-        </p:txBody>
-      </p:sp>
-      <p:cxnSp>
-        <p:nvCxnSpPr>
-          <p:cNvPr id="95" name="Straight Arrow Connector 94"/>
-          <p:cNvCxnSpPr/>
-          <p:nvPr/>
-        </p:nvCxnSpPr>
-        <p:spPr bwMode="auto">
-          <a:xfrm flipH="1">
-            <a:off x="598139" y="6431861"/>
-            <a:ext cx="3972757" cy="0"/>
-          </a:xfrm>
-          <a:prstGeom prst="straightConnector1">
-            <a:avLst/>
-          </a:prstGeom>
-          <a:solidFill>
-            <a:schemeClr val="accent1"/>
-          </a:solidFill>
-          <a:ln w="3175" cap="flat" cmpd="sng" algn="ctr">
-            <a:solidFill>
-              <a:schemeClr val="tx1"/>
-            </a:solidFill>
-            <a:prstDash val="sysDash"/>
-            <a:round/>
-            <a:headEnd type="none" w="med" len="med"/>
-            <a:tailEnd type="arrow"/>
-          </a:ln>
-          <a:effectLst/>
-        </p:spPr>
-      </p:cxnSp>
-      <p:sp>
-        <p:nvSpPr>
-          <p:cNvPr id="96" name="TextBox 95"/>
-          <p:cNvSpPr txBox="1"/>
-          <p:nvPr/>
-        </p:nvSpPr>
-        <p:spPr>
-          <a:xfrm>
-            <a:off x="3649736" y="6218840"/>
-            <a:ext cx="797256" cy="246221"/>
-          </a:xfrm>
-          <a:prstGeom prst="rect">
-            <a:avLst/>
-          </a:prstGeom>
-          <a:noFill/>
-        </p:spPr>
-        <p:txBody>
-          <a:bodyPr wrap="square" rtlCol="0">
-            <a:spAutoFit/>
-          </a:bodyPr>
-          <a:lstStyle/>
-          <a:p>
-            <a:pPr algn="r"/>
-            <a:r>
-              <a:rPr lang="en-US" sz="1000">
-                <a:latin typeface="Consolas"/>
-                <a:cs typeface="Consolas"/>
-              </a:rPr>
-              <a:t>OK</a:t>
+              <a:t>Read: APDU Responses</a:t>
             </a:r>
           </a:p>
         </p:txBody>

</xml_diff>